<commit_message>
Added problem statement to pitch
</commit_message>
<xml_diff>
--- a/Claimless - Pitch.pptx
+++ b/Claimless - Pitch.pptx
@@ -6,6 +6,7 @@
   </p:sldMasterIdLst>
   <p:sldIdLst>
     <p:sldId id="256" r:id="rId2"/>
+    <p:sldId id="257" r:id="rId3"/>
   </p:sldIdLst>
   <p:sldSz cx="12192000" cy="6858000"/>
   <p:notesSz cx="6858000" cy="9144000"/>
@@ -104,7 +105,16 @@
       </a:defRPr>
     </a:lvl9pPr>
   </p:defaultTextStyle>
+  <p:extLst>
+    <p:ext uri="{EFAFB233-063F-42B5-8137-9DF3F51BA10A}">
+      <p15:sldGuideLst xmlns:p15="http://schemas.microsoft.com/office/powerpoint/2012/main"/>
+    </p:ext>
+  </p:extLst>
 </p:presentation>
+</file>
+
+<file path=ppt/revisionInfo.xml><?xml version="1.0" encoding="utf-8"?>
+<p1510:revInfo xmlns:a="http://schemas.openxmlformats.org/drawingml/2006/main" xmlns:r="http://schemas.openxmlformats.org/officeDocument/2006/relationships" xmlns:p1510="http://schemas.microsoft.com/office/powerpoint/2015/10/main"/>
 </file>
 
 <file path=ppt/slideLayouts/slideLayout1.xml><?xml version="1.0" encoding="utf-8"?>
@@ -3021,6 +3031,108 @@
 </p:sld>
 </file>
 
+<file path=ppt/slides/slide2.xml><?xml version="1.0" encoding="utf-8"?>
+<p:sld xmlns:a="http://schemas.openxmlformats.org/drawingml/2006/main" xmlns:r="http://schemas.openxmlformats.org/officeDocument/2006/relationships" xmlns:p="http://schemas.openxmlformats.org/presentationml/2006/main">
+  <p:cSld>
+    <p:spTree>
+      <p:nvGrpSpPr>
+        <p:cNvPr id="1" name=""/>
+        <p:cNvGrpSpPr/>
+        <p:nvPr/>
+      </p:nvGrpSpPr>
+      <p:grpSpPr>
+        <a:xfrm>
+          <a:off x="0" y="0"/>
+          <a:ext cx="0" cy="0"/>
+          <a:chOff x="0" y="0"/>
+          <a:chExt cx="0" cy="0"/>
+        </a:xfrm>
+      </p:grpSpPr>
+      <p:sp>
+        <p:nvSpPr>
+          <p:cNvPr id="2" name="Title 1">
+            <a:extLst>
+              <a:ext uri="{FF2B5EF4-FFF2-40B4-BE49-F238E27FC236}">
+                <a16:creationId xmlns:a16="http://schemas.microsoft.com/office/drawing/2014/main" id="{C11FEA97-ED38-46DF-8EEC-F00EA9FB80B8}"/>
+              </a:ext>
+            </a:extLst>
+          </p:cNvPr>
+          <p:cNvSpPr>
+            <a:spLocks noGrp="1"/>
+          </p:cNvSpPr>
+          <p:nvPr>
+            <p:ph type="title"/>
+          </p:nvPr>
+        </p:nvSpPr>
+        <p:spPr/>
+        <p:txBody>
+          <a:bodyPr/>
+          <a:lstStyle/>
+          <a:p>
+            <a:r>
+              <a:rPr lang="en-GB" dirty="0"/>
+              <a:t>Problem</a:t>
+            </a:r>
+          </a:p>
+        </p:txBody>
+      </p:sp>
+      <p:sp>
+        <p:nvSpPr>
+          <p:cNvPr id="3" name="Content Placeholder 2">
+            <a:extLst>
+              <a:ext uri="{FF2B5EF4-FFF2-40B4-BE49-F238E27FC236}">
+                <a16:creationId xmlns:a16="http://schemas.microsoft.com/office/drawing/2014/main" id="{4504334A-5836-4E32-930B-6573DEF85645}"/>
+              </a:ext>
+            </a:extLst>
+          </p:cNvPr>
+          <p:cNvSpPr>
+            <a:spLocks noGrp="1"/>
+          </p:cNvSpPr>
+          <p:nvPr>
+            <p:ph idx="1"/>
+          </p:nvPr>
+        </p:nvSpPr>
+        <p:spPr/>
+        <p:txBody>
+          <a:bodyPr/>
+          <a:lstStyle/>
+          <a:p>
+            <a:r>
+              <a:rPr lang="en-GB" dirty="0"/>
+              <a:t>No claim bonuses are usually locked into a single insurer and to a single insurance type.</a:t>
+            </a:r>
+          </a:p>
+          <a:p>
+            <a:r>
+              <a:rPr lang="en-GB" dirty="0"/>
+              <a:t>As an insurance customer there is no easy way to demonstrate your personal claim history without divulging personal information.</a:t>
+            </a:r>
+          </a:p>
+          <a:p>
+            <a:r>
+              <a:rPr lang="en-GB" b="1" dirty="0"/>
+              <a:t>RESULT: There is no way to prove you are a good quality low risk customer to all insurance providers.</a:t>
+            </a:r>
+            <a:r>
+              <a:rPr lang="en-GB" dirty="0"/>
+              <a:t> </a:t>
+            </a:r>
+          </a:p>
+        </p:txBody>
+      </p:sp>
+    </p:spTree>
+    <p:extLst>
+      <p:ext uri="{BB962C8B-B14F-4D97-AF65-F5344CB8AC3E}">
+        <p14:creationId xmlns:p14="http://schemas.microsoft.com/office/powerpoint/2010/main" val="1359289034"/>
+      </p:ext>
+    </p:extLst>
+  </p:cSld>
+  <p:clrMapOvr>
+    <a:masterClrMapping/>
+  </p:clrMapOvr>
+</p:sld>
+</file>
+
 <file path=ppt/theme/theme1.xml><?xml version="1.0" encoding="utf-8"?>
 <a:theme xmlns:a="http://schemas.openxmlformats.org/drawingml/2006/main" name="Office Theme">
   <a:themeElements>

</xml_diff>

<commit_message>
Added solution page to pitch
</commit_message>
<xml_diff>
--- a/Claimless - Pitch.pptx
+++ b/Claimless - Pitch.pptx
@@ -7,6 +7,7 @@
   <p:sldIdLst>
     <p:sldId id="256" r:id="rId2"/>
     <p:sldId id="257" r:id="rId3"/>
+    <p:sldId id="258" r:id="rId4"/>
   </p:sldIdLst>
   <p:sldSz cx="12192000" cy="6858000"/>
   <p:notesSz cx="6858000" cy="9144000"/>
@@ -3133,6 +3134,124 @@
 </p:sld>
 </file>
 
+<file path=ppt/slides/slide3.xml><?xml version="1.0" encoding="utf-8"?>
+<p:sld xmlns:a="http://schemas.openxmlformats.org/drawingml/2006/main" xmlns:r="http://schemas.openxmlformats.org/officeDocument/2006/relationships" xmlns:p="http://schemas.openxmlformats.org/presentationml/2006/main">
+  <p:cSld>
+    <p:spTree>
+      <p:nvGrpSpPr>
+        <p:cNvPr id="1" name=""/>
+        <p:cNvGrpSpPr/>
+        <p:nvPr/>
+      </p:nvGrpSpPr>
+      <p:grpSpPr>
+        <a:xfrm>
+          <a:off x="0" y="0"/>
+          <a:ext cx="0" cy="0"/>
+          <a:chOff x="0" y="0"/>
+          <a:chExt cx="0" cy="0"/>
+        </a:xfrm>
+      </p:grpSpPr>
+      <p:sp>
+        <p:nvSpPr>
+          <p:cNvPr id="2" name="Title 1">
+            <a:extLst>
+              <a:ext uri="{FF2B5EF4-FFF2-40B4-BE49-F238E27FC236}">
+                <a16:creationId xmlns:a16="http://schemas.microsoft.com/office/drawing/2014/main" id="{A2168AB2-0A6D-4CE7-A51E-DA99429D8128}"/>
+              </a:ext>
+            </a:extLst>
+          </p:cNvPr>
+          <p:cNvSpPr>
+            <a:spLocks noGrp="1"/>
+          </p:cNvSpPr>
+          <p:nvPr>
+            <p:ph type="title"/>
+          </p:nvPr>
+        </p:nvSpPr>
+        <p:spPr/>
+        <p:txBody>
+          <a:bodyPr/>
+          <a:lstStyle/>
+          <a:p>
+            <a:r>
+              <a:rPr lang="en-GB" dirty="0"/>
+              <a:t>Solution</a:t>
+            </a:r>
+          </a:p>
+        </p:txBody>
+      </p:sp>
+      <p:sp>
+        <p:nvSpPr>
+          <p:cNvPr id="3" name="Content Placeholder 2">
+            <a:extLst>
+              <a:ext uri="{FF2B5EF4-FFF2-40B4-BE49-F238E27FC236}">
+                <a16:creationId xmlns:a16="http://schemas.microsoft.com/office/drawing/2014/main" id="{4DED0E3E-6B8C-4B4C-8197-BC446118D466}"/>
+              </a:ext>
+            </a:extLst>
+          </p:cNvPr>
+          <p:cNvSpPr>
+            <a:spLocks noGrp="1"/>
+          </p:cNvSpPr>
+          <p:nvPr>
+            <p:ph idx="1"/>
+          </p:nvPr>
+        </p:nvSpPr>
+        <p:spPr/>
+        <p:txBody>
+          <a:bodyPr>
+            <a:normAutofit lnSpcReduction="10000"/>
+          </a:bodyPr>
+          <a:lstStyle/>
+          <a:p>
+            <a:r>
+              <a:rPr lang="en-GB" dirty="0"/>
+              <a:t>Transfer “No Claim Bonus” (NCB) tokens into a customer account when a policy expires without a claim incurred.</a:t>
+            </a:r>
+          </a:p>
+          <a:p>
+            <a:r>
+              <a:rPr lang="en-GB" dirty="0"/>
+              <a:t>The numbers of NCB tokens transferred is directly related to the total premium.</a:t>
+            </a:r>
+          </a:p>
+          <a:p>
+            <a:r>
+              <a:rPr lang="en-GB" dirty="0"/>
+              <a:t>No tokens are transferred if a claim has occurred. </a:t>
+            </a:r>
+          </a:p>
+          <a:p>
+            <a:r>
+              <a:rPr lang="en-GB" dirty="0"/>
+              <a:t>A proportional number of tokens are transferred is a policy is prematurely cancelled.</a:t>
+            </a:r>
+          </a:p>
+          <a:p>
+            <a:r>
+              <a:rPr lang="en-GB" dirty="0"/>
+              <a:t>Participating insurance providers can offer discounted premium rates in exchange for NCB tokens.  </a:t>
+            </a:r>
+          </a:p>
+          <a:p>
+            <a:r>
+              <a:rPr lang="en-GB" dirty="0"/>
+              <a:t>The insurance provider determines the value of NCB tokens.</a:t>
+            </a:r>
+          </a:p>
+        </p:txBody>
+      </p:sp>
+    </p:spTree>
+    <p:extLst>
+      <p:ext uri="{BB962C8B-B14F-4D97-AF65-F5344CB8AC3E}">
+        <p14:creationId xmlns:p14="http://schemas.microsoft.com/office/powerpoint/2010/main" val="4213946638"/>
+      </p:ext>
+    </p:extLst>
+  </p:cSld>
+  <p:clrMapOvr>
+    <a:masterClrMapping/>
+  </p:clrMapOvr>
+</p:sld>
+</file>
+
 <file path=ppt/theme/theme1.xml><?xml version="1.0" encoding="utf-8"?>
 <a:theme xmlns:a="http://schemas.openxmlformats.org/drawingml/2006/main" name="Office Theme">
   <a:themeElements>

</xml_diff>

<commit_message>
switch consumer & insurer colors
</commit_message>
<xml_diff>
--- a/Claimless - Pitch.pptx
+++ b/Claimless - Pitch.pptx
@@ -2983,7 +2983,7 @@
           <p:cNvPr id="5" name="Picture 4">
             <a:extLst>
               <a:ext uri="{FF2B5EF4-FFF2-40B4-BE49-F238E27FC236}">
-                <a16:creationId xmlns:a16="http://schemas.microsoft.com/office/drawing/2014/main" id="{C21F03D9-D255-4BAF-BBEF-9696EE031703}"/>
+                <a16:creationId xmlns:a16="http://schemas.microsoft.com/office/drawing/2014/main" xmlns="" id="{C21F03D9-D255-4BAF-BBEF-9696EE031703}"/>
               </a:ext>
             </a:extLst>
           </p:cNvPr>
@@ -3014,6 +3014,75 @@
           </a:prstGeom>
         </p:spPr>
       </p:pic>
+      <p:sp>
+        <p:nvSpPr>
+          <p:cNvPr id="4" name="Title 1">
+            <a:extLst>
+              <a:ext uri="{FF2B5EF4-FFF2-40B4-BE49-F238E27FC236}">
+                <a16:creationId xmlns:a16="http://schemas.microsoft.com/office/drawing/2014/main" xmlns="" id="{5D243D52-5A28-4854-A962-EE1EC8A687A0}"/>
+              </a:ext>
+            </a:extLst>
+          </p:cNvPr>
+          <p:cNvSpPr txBox="1">
+            <a:spLocks/>
+          </p:cNvSpPr>
+          <p:nvPr/>
+        </p:nvSpPr>
+        <p:spPr>
+          <a:xfrm>
+            <a:off x="838200" y="5007415"/>
+            <a:ext cx="10515600" cy="430133"/>
+          </a:xfrm>
+          <a:prstGeom prst="rect">
+            <a:avLst/>
+          </a:prstGeom>
+        </p:spPr>
+        <p:txBody>
+          <a:bodyPr vert="horz" lIns="91440" tIns="45720" rIns="91440" bIns="45720" rtlCol="0" anchor="b">
+            <a:normAutofit/>
+          </a:bodyPr>
+          <a:lstStyle>
+            <a:lvl1pPr algn="ctr" defTabSz="914400" rtl="0" eaLnBrk="1" latinLnBrk="0" hangingPunct="1">
+              <a:lnSpc>
+                <a:spcPct val="90000"/>
+              </a:lnSpc>
+              <a:spcBef>
+                <a:spcPct val="0"/>
+              </a:spcBef>
+              <a:buNone/>
+              <a:defRPr sz="6000" kern="1200">
+                <a:solidFill>
+                  <a:schemeClr val="tx1"/>
+                </a:solidFill>
+                <a:latin typeface="+mj-lt"/>
+                <a:ea typeface="+mj-ea"/>
+                <a:cs typeface="+mj-cs"/>
+              </a:defRPr>
+            </a:lvl1pPr>
+          </a:lstStyle>
+          <a:p>
+            <a:r>
+              <a:rPr lang="en-GB" sz="2400" dirty="0" smtClean="0">
+                <a:solidFill>
+                  <a:srgbClr val="144C71"/>
+                </a:solidFill>
+                <a:latin typeface="Source Sans Pro Light" charset="0"/>
+                <a:ea typeface="Source Sans Pro Light" charset="0"/>
+                <a:cs typeface="Source Sans Pro Light" charset="0"/>
+              </a:rPr>
+              <a:t>Universal No-Claim Bonus</a:t>
+            </a:r>
+            <a:endParaRPr lang="en-GB" sz="2400" dirty="0">
+              <a:solidFill>
+                <a:srgbClr val="144C71"/>
+              </a:solidFill>
+              <a:latin typeface="Source Sans Pro Light" charset="0"/>
+              <a:ea typeface="Source Sans Pro Light" charset="0"/>
+              <a:cs typeface="Source Sans Pro Light" charset="0"/>
+            </a:endParaRPr>
+          </a:p>
+        </p:txBody>
+      </p:sp>
     </p:spTree>
     <p:extLst>
       <p:ext uri="{BB962C8B-B14F-4D97-AF65-F5344CB8AC3E}">
@@ -3049,7 +3118,7 @@
           <p:cNvPr id="2" name="Title 1">
             <a:extLst>
               <a:ext uri="{FF2B5EF4-FFF2-40B4-BE49-F238E27FC236}">
-                <a16:creationId xmlns:a16="http://schemas.microsoft.com/office/drawing/2014/main" id="{5D243D52-5A28-4854-A962-EE1EC8A687A0}"/>
+                <a16:creationId xmlns:a16="http://schemas.microsoft.com/office/drawing/2014/main" xmlns="" id="{5D243D52-5A28-4854-A962-EE1EC8A687A0}"/>
               </a:ext>
             </a:extLst>
           </p:cNvPr>
@@ -3084,7 +3153,7 @@
           <p:cNvPr id="3" name="Content Placeholder 2">
             <a:extLst>
               <a:ext uri="{FF2B5EF4-FFF2-40B4-BE49-F238E27FC236}">
-                <a16:creationId xmlns:a16="http://schemas.microsoft.com/office/drawing/2014/main" id="{0437BF45-5AB5-4C2A-8C06-6A2804E9F027}"/>
+                <a16:creationId xmlns:a16="http://schemas.microsoft.com/office/drawing/2014/main" xmlns="" id="{0437BF45-5AB5-4C2A-8C06-6A2804E9F027}"/>
               </a:ext>
             </a:extLst>
           </p:cNvPr>
@@ -3147,7 +3216,7 @@
           <p:cNvPr id="5" name="Picture 4">
             <a:extLst>
               <a:ext uri="{FF2B5EF4-FFF2-40B4-BE49-F238E27FC236}">
-                <a16:creationId xmlns:a16="http://schemas.microsoft.com/office/drawing/2014/main" id="{A0430F65-FED6-4E0E-BCAA-552F508EC5A8}"/>
+                <a16:creationId xmlns:a16="http://schemas.microsoft.com/office/drawing/2014/main" xmlns="" id="{A0430F65-FED6-4E0E-BCAA-552F508EC5A8}"/>
               </a:ext>
             </a:extLst>
           </p:cNvPr>
@@ -3314,7 +3383,7 @@
           <p:cNvPr id="5" name="Picture 4">
             <a:extLst>
               <a:ext uri="{FF2B5EF4-FFF2-40B4-BE49-F238E27FC236}">
-                <a16:creationId xmlns:a16="http://schemas.microsoft.com/office/drawing/2014/main" id="{A0430F65-FED6-4E0E-BCAA-552F508EC5A8}"/>
+                <a16:creationId xmlns:a16="http://schemas.microsoft.com/office/drawing/2014/main" xmlns="" id="{A0430F65-FED6-4E0E-BCAA-552F508EC5A8}"/>
               </a:ext>
             </a:extLst>
           </p:cNvPr>
@@ -3410,7 +3479,7 @@
           <p:cNvPr id="7" name="Picture 6">
             <a:extLst>
               <a:ext uri="{FF2B5EF4-FFF2-40B4-BE49-F238E27FC236}">
-                <a16:creationId xmlns:a16="http://schemas.microsoft.com/office/drawing/2014/main" id="{C21F03D9-D255-4BAF-BBEF-9696EE031703}"/>
+                <a16:creationId xmlns:a16="http://schemas.microsoft.com/office/drawing/2014/main" xmlns="" id="{C21F03D9-D255-4BAF-BBEF-9696EE031703}"/>
               </a:ext>
             </a:extLst>
           </p:cNvPr>
@@ -3446,7 +3515,7 @@
           <p:cNvPr id="6" name="Title 1">
             <a:extLst>
               <a:ext uri="{FF2B5EF4-FFF2-40B4-BE49-F238E27FC236}">
-                <a16:creationId xmlns:a16="http://schemas.microsoft.com/office/drawing/2014/main" id="{5D243D52-5A28-4854-A962-EE1EC8A687A0}"/>
+                <a16:creationId xmlns:a16="http://schemas.microsoft.com/office/drawing/2014/main" xmlns="" id="{5D243D52-5A28-4854-A962-EE1EC8A687A0}"/>
               </a:ext>
             </a:extLst>
           </p:cNvPr>
@@ -3569,7 +3638,7 @@
         </p:spPr>
         <p:txBody>
           <a:bodyPr>
-            <a:normAutofit lnSpcReduction="10000"/>
+            <a:normAutofit/>
           </a:bodyPr>
           <a:lstStyle/>
           <a:p>
@@ -3756,7 +3825,7 @@
           <p:cNvPr id="6" name="Picture 5">
             <a:extLst>
               <a:ext uri="{FF2B5EF4-FFF2-40B4-BE49-F238E27FC236}">
-                <a16:creationId xmlns:a16="http://schemas.microsoft.com/office/drawing/2014/main" id="{A0430F65-FED6-4E0E-BCAA-552F508EC5A8}"/>
+                <a16:creationId xmlns:a16="http://schemas.microsoft.com/office/drawing/2014/main" xmlns="" id="{A0430F65-FED6-4E0E-BCAA-552F508EC5A8}"/>
               </a:ext>
             </a:extLst>
           </p:cNvPr>
@@ -3852,7 +3921,7 @@
           <p:cNvPr id="6" name="Picture 5">
             <a:extLst>
               <a:ext uri="{FF2B5EF4-FFF2-40B4-BE49-F238E27FC236}">
-                <a16:creationId xmlns:a16="http://schemas.microsoft.com/office/drawing/2014/main" id="{A0430F65-FED6-4E0E-BCAA-552F508EC5A8}"/>
+                <a16:creationId xmlns:a16="http://schemas.microsoft.com/office/drawing/2014/main" xmlns="" id="{A0430F65-FED6-4E0E-BCAA-552F508EC5A8}"/>
               </a:ext>
             </a:extLst>
           </p:cNvPr>
@@ -3888,7 +3957,7 @@
           <p:cNvPr id="8" name="Title 1">
             <a:extLst>
               <a:ext uri="{FF2B5EF4-FFF2-40B4-BE49-F238E27FC236}">
-                <a16:creationId xmlns:a16="http://schemas.microsoft.com/office/drawing/2014/main" id="{5D243D52-5A28-4854-A962-EE1EC8A687A0}"/>
+                <a16:creationId xmlns:a16="http://schemas.microsoft.com/office/drawing/2014/main" xmlns="" id="{5D243D52-5A28-4854-A962-EE1EC8A687A0}"/>
               </a:ext>
             </a:extLst>
           </p:cNvPr>
@@ -3946,7 +4015,7 @@
           <p:cNvPr id="9" name="Title 1">
             <a:extLst>
               <a:ext uri="{FF2B5EF4-FFF2-40B4-BE49-F238E27FC236}">
-                <a16:creationId xmlns:a16="http://schemas.microsoft.com/office/drawing/2014/main" id="{5D243D52-5A28-4854-A962-EE1EC8A687A0}"/>
+                <a16:creationId xmlns:a16="http://schemas.microsoft.com/office/drawing/2014/main" xmlns="" id="{5D243D52-5A28-4854-A962-EE1EC8A687A0}"/>
               </a:ext>
             </a:extLst>
           </p:cNvPr>
@@ -3986,7 +4055,7 @@
           <p:cNvPr id="10" name="Content Placeholder 2">
             <a:extLst>
               <a:ext uri="{FF2B5EF4-FFF2-40B4-BE49-F238E27FC236}">
-                <a16:creationId xmlns:a16="http://schemas.microsoft.com/office/drawing/2014/main" id="{0437BF45-5AB5-4C2A-8C06-6A2804E9F027}"/>
+                <a16:creationId xmlns:a16="http://schemas.microsoft.com/office/drawing/2014/main" xmlns="" id="{0437BF45-5AB5-4C2A-8C06-6A2804E9F027}"/>
               </a:ext>
             </a:extLst>
           </p:cNvPr>

</xml_diff>